<commit_message>
the rains of castamere
</commit_message>
<xml_diff>
--- a/presentations/presentation_1.pptx
+++ b/presentations/presentation_1.pptx
@@ -11,8 +11,8 @@
     <p:sldId id="271" r:id="rId5"/>
     <p:sldId id="258" r:id="rId6"/>
     <p:sldId id="259" r:id="rId7"/>
-    <p:sldId id="269" r:id="rId8"/>
-    <p:sldId id="268" r:id="rId9"/>
+    <p:sldId id="272" r:id="rId8"/>
+    <p:sldId id="273" r:id="rId9"/>
     <p:sldId id="261" r:id="rId10"/>
     <p:sldId id="266" r:id="rId11"/>
     <p:sldId id="262" r:id="rId12"/>
@@ -4329,8 +4329,24 @@
           <a:p>
             <a:pPr lvl="1"/>
             <a:r>
+              <a:rPr lang="sv-SE" dirty="0" err="1" smtClean="0"/>
+              <a:t>Calculating</a:t>
+            </a:r>
+            <a:r>
               <a:rPr lang="sv-SE" dirty="0" smtClean="0"/>
-              <a:t>Data processing</a:t>
+              <a:t> </a:t>
+            </a:r>
+            <a:r>
+              <a:rPr lang="sv-SE" dirty="0" err="1" smtClean="0"/>
+              <a:t>virtual</a:t>
+            </a:r>
+            <a:r>
+              <a:rPr lang="sv-SE" dirty="0" smtClean="0"/>
+              <a:t> fly </a:t>
+            </a:r>
+            <a:r>
+              <a:rPr lang="sv-SE" dirty="0" err="1" smtClean="0"/>
+              <a:t>movement</a:t>
             </a:r>
             <a:endParaRPr lang="sv-SE" dirty="0"/>
           </a:p>
@@ -4779,7 +4795,7 @@
         <p:spPr/>
         <p:txBody>
           <a:bodyPr>
-            <a:normAutofit/>
+            <a:normAutofit fontScale="92500" lnSpcReduction="10000"/>
           </a:bodyPr>
           <a:lstStyle/>
           <a:p>
@@ -4854,6 +4870,18 @@
             <a:r>
               <a:rPr lang="sv-SE" dirty="0" err="1" smtClean="0"/>
               <a:t>Calibration</a:t>
+            </a:r>
+            <a:endParaRPr lang="sv-SE" dirty="0" smtClean="0"/>
+          </a:p>
+          <a:p>
+            <a:pPr lvl="1"/>
+            <a:r>
+              <a:rPr lang="sv-SE" dirty="0" err="1" smtClean="0"/>
+              <a:t>Shorter</a:t>
+            </a:r>
+            <a:r>
+              <a:rPr lang="sv-SE" dirty="0" smtClean="0"/>
+              <a:t> sprints</a:t>
             </a:r>
             <a:endParaRPr lang="sv-SE" dirty="0" smtClean="0"/>
           </a:p>
@@ -5186,6 +5214,49 @@
                                   </p:childTnLst>
                                 </p:cTn>
                               </p:par>
+                              <p:par>
+                                <p:cTn id="24" presetID="22" presetClass="entr" presetSubtype="4" fill="hold" grpId="0" nodeType="withEffect">
+                                  <p:stCondLst>
+                                    <p:cond delay="0"/>
+                                  </p:stCondLst>
+                                  <p:childTnLst>
+                                    <p:set>
+                                      <p:cBhvr>
+                                        <p:cTn id="25" dur="1" fill="hold">
+                                          <p:stCondLst>
+                                            <p:cond delay="0"/>
+                                          </p:stCondLst>
+                                        </p:cTn>
+                                        <p:tgtEl>
+                                          <p:spTgt spid="3">
+                                            <p:txEl>
+                                              <p:pRg st="5" end="5"/>
+                                            </p:txEl>
+                                          </p:spTgt>
+                                        </p:tgtEl>
+                                        <p:attrNameLst>
+                                          <p:attrName>style.visibility</p:attrName>
+                                        </p:attrNameLst>
+                                      </p:cBhvr>
+                                      <p:to>
+                                        <p:strVal val="visible"/>
+                                      </p:to>
+                                    </p:set>
+                                    <p:animEffect transition="in" filter="wipe(down)">
+                                      <p:cBhvr>
+                                        <p:cTn id="26" dur="500"/>
+                                        <p:tgtEl>
+                                          <p:spTgt spid="3">
+                                            <p:txEl>
+                                              <p:pRg st="5" end="5"/>
+                                            </p:txEl>
+                                          </p:spTgt>
+                                        </p:tgtEl>
+                                      </p:cBhvr>
+                                    </p:animEffect>
+                                  </p:childTnLst>
+                                </p:cTn>
+                              </p:par>
                             </p:childTnLst>
                           </p:cTn>
                         </p:par>
@@ -5193,62 +5264,19 @@
                     </p:cTn>
                   </p:par>
                   <p:par>
-                    <p:cTn id="24" fill="hold">
+                    <p:cTn id="27" fill="hold">
                       <p:stCondLst>
                         <p:cond delay="indefinite"/>
                       </p:stCondLst>
                       <p:childTnLst>
                         <p:par>
-                          <p:cTn id="25" fill="hold">
+                          <p:cTn id="28" fill="hold">
                             <p:stCondLst>
                               <p:cond delay="0"/>
                             </p:stCondLst>
                             <p:childTnLst>
                               <p:par>
-                                <p:cTn id="26" presetID="22" presetClass="entr" presetSubtype="4" fill="hold" grpId="0" nodeType="clickEffect">
-                                  <p:stCondLst>
-                                    <p:cond delay="0"/>
-                                  </p:stCondLst>
-                                  <p:childTnLst>
-                                    <p:set>
-                                      <p:cBhvr>
-                                        <p:cTn id="27" dur="1" fill="hold">
-                                          <p:stCondLst>
-                                            <p:cond delay="0"/>
-                                          </p:stCondLst>
-                                        </p:cTn>
-                                        <p:tgtEl>
-                                          <p:spTgt spid="3">
-                                            <p:txEl>
-                                              <p:pRg st="5" end="5"/>
-                                            </p:txEl>
-                                          </p:spTgt>
-                                        </p:tgtEl>
-                                        <p:attrNameLst>
-                                          <p:attrName>style.visibility</p:attrName>
-                                        </p:attrNameLst>
-                                      </p:cBhvr>
-                                      <p:to>
-                                        <p:strVal val="visible"/>
-                                      </p:to>
-                                    </p:set>
-                                    <p:animEffect transition="in" filter="wipe(down)">
-                                      <p:cBhvr>
-                                        <p:cTn id="28" dur="500"/>
-                                        <p:tgtEl>
-                                          <p:spTgt spid="3">
-                                            <p:txEl>
-                                              <p:pRg st="5" end="5"/>
-                                            </p:txEl>
-                                          </p:spTgt>
-                                        </p:tgtEl>
-                                      </p:cBhvr>
-                                    </p:animEffect>
-                                  </p:childTnLst>
-                                </p:cTn>
-                              </p:par>
-                              <p:par>
-                                <p:cTn id="29" presetID="22" presetClass="entr" presetSubtype="4" fill="hold" grpId="0" nodeType="withEffect">
+                                <p:cTn id="29" presetID="22" presetClass="entr" presetSubtype="4" fill="hold" grpId="0" nodeType="clickEffect">
                                   <p:stCondLst>
                                     <p:cond delay="0"/>
                                   </p:stCondLst>
@@ -5325,6 +5353,49 @@
                                           <p:spTgt spid="3">
                                             <p:txEl>
                                               <p:pRg st="7" end="7"/>
+                                            </p:txEl>
+                                          </p:spTgt>
+                                        </p:tgtEl>
+                                      </p:cBhvr>
+                                    </p:animEffect>
+                                  </p:childTnLst>
+                                </p:cTn>
+                              </p:par>
+                              <p:par>
+                                <p:cTn id="35" presetID="22" presetClass="entr" presetSubtype="4" fill="hold" grpId="0" nodeType="withEffect">
+                                  <p:stCondLst>
+                                    <p:cond delay="0"/>
+                                  </p:stCondLst>
+                                  <p:childTnLst>
+                                    <p:set>
+                                      <p:cBhvr>
+                                        <p:cTn id="36" dur="1" fill="hold">
+                                          <p:stCondLst>
+                                            <p:cond delay="0"/>
+                                          </p:stCondLst>
+                                        </p:cTn>
+                                        <p:tgtEl>
+                                          <p:spTgt spid="3">
+                                            <p:txEl>
+                                              <p:pRg st="8" end="8"/>
+                                            </p:txEl>
+                                          </p:spTgt>
+                                        </p:tgtEl>
+                                        <p:attrNameLst>
+                                          <p:attrName>style.visibility</p:attrName>
+                                        </p:attrNameLst>
+                                      </p:cBhvr>
+                                      <p:to>
+                                        <p:strVal val="visible"/>
+                                      </p:to>
+                                    </p:set>
+                                    <p:animEffect transition="in" filter="wipe(down)">
+                                      <p:cBhvr>
+                                        <p:cTn id="37" dur="500"/>
+                                        <p:tgtEl>
+                                          <p:spTgt spid="3">
+                                            <p:txEl>
+                                              <p:pRg st="8" end="8"/>
                                             </p:txEl>
                                           </p:spTgt>
                                         </p:tgtEl>
@@ -6189,26 +6260,125 @@
           <a:p>
             <a:r>
               <a:rPr lang="sv-SE" dirty="0" smtClean="0"/>
-              <a:t>Analysis and design</a:t>
-            </a:r>
-          </a:p>
-          <a:p>
+              <a:t>20 </a:t>
+            </a:r>
+            <a:r>
+              <a:rPr lang="sv-SE" dirty="0" err="1" smtClean="0"/>
+              <a:t>weeks</a:t>
+            </a:r>
+            <a:endParaRPr lang="sv-SE" dirty="0" smtClean="0"/>
+          </a:p>
+          <a:p>
+            <a:r>
+              <a:rPr lang="sv-SE" dirty="0" err="1" smtClean="0"/>
+              <a:t>Agile</a:t>
+            </a:r>
             <a:r>
               <a:rPr lang="sv-SE" dirty="0" smtClean="0"/>
+              <a:t> </a:t>
+            </a:r>
+            <a:r>
+              <a:rPr lang="sv-SE" dirty="0" err="1" smtClean="0"/>
+              <a:t>user-centered</a:t>
+            </a:r>
+            <a:r>
+              <a:rPr lang="sv-SE" dirty="0" smtClean="0"/>
+              <a:t> process</a:t>
+            </a:r>
+          </a:p>
+          <a:p>
+            <a:r>
+              <a:rPr lang="sv-SE" dirty="0" smtClean="0"/>
+              <a:t>The plan:</a:t>
+            </a:r>
+          </a:p>
+          <a:p>
+            <a:pPr lvl="1"/>
+            <a:r>
+              <a:rPr lang="sv-SE" dirty="0" smtClean="0"/>
+              <a:t>Initial </a:t>
+            </a:r>
+            <a:r>
+              <a:rPr lang="sv-SE" dirty="0" err="1" smtClean="0"/>
+              <a:t>phase</a:t>
+            </a:r>
+            <a:r>
+              <a:rPr lang="sv-SE" dirty="0" smtClean="0"/>
+              <a:t> (3 </a:t>
+            </a:r>
+            <a:r>
+              <a:rPr lang="sv-SE" dirty="0" err="1" smtClean="0"/>
+              <a:t>weeks</a:t>
+            </a:r>
+            <a:r>
+              <a:rPr lang="sv-SE" dirty="0" smtClean="0"/>
+              <a:t>)</a:t>
+            </a:r>
+            <a:endParaRPr lang="sv-SE" dirty="0" smtClean="0"/>
+          </a:p>
+          <a:p>
+            <a:pPr lvl="1"/>
+            <a:r>
+              <a:rPr lang="sv-SE" dirty="0" err="1" smtClean="0"/>
               <a:t>Implementation</a:t>
             </a:r>
-          </a:p>
-          <a:p>
             <a:r>
               <a:rPr lang="sv-SE" dirty="0" smtClean="0"/>
+              <a:t> (10 </a:t>
+            </a:r>
+            <a:r>
+              <a:rPr lang="sv-SE" dirty="0" err="1" smtClean="0"/>
+              <a:t>weeks</a:t>
+            </a:r>
+            <a:r>
+              <a:rPr lang="sv-SE" dirty="0" smtClean="0"/>
+              <a:t>)  </a:t>
+            </a:r>
+            <a:endParaRPr lang="sv-SE" dirty="0" smtClean="0"/>
+          </a:p>
+          <a:p>
+            <a:pPr lvl="1"/>
+            <a:r>
+              <a:rPr lang="sv-SE" dirty="0" err="1" smtClean="0"/>
               <a:t>Evaluation</a:t>
             </a:r>
-          </a:p>
-          <a:p>
             <a:r>
               <a:rPr lang="sv-SE" dirty="0" smtClean="0"/>
-              <a:t>Finalizing report</a:t>
-            </a:r>
+              <a:t> (2 </a:t>
+            </a:r>
+            <a:r>
+              <a:rPr lang="sv-SE" dirty="0" err="1" smtClean="0"/>
+              <a:t>weeks</a:t>
+            </a:r>
+            <a:r>
+              <a:rPr lang="sv-SE" dirty="0" smtClean="0"/>
+              <a:t>) </a:t>
+            </a:r>
+            <a:endParaRPr lang="sv-SE" dirty="0" smtClean="0"/>
+          </a:p>
+          <a:p>
+            <a:pPr lvl="1"/>
+            <a:r>
+              <a:rPr lang="sv-SE" dirty="0" err="1" smtClean="0"/>
+              <a:t>Finalizing</a:t>
+            </a:r>
+            <a:r>
+              <a:rPr lang="sv-SE" dirty="0" smtClean="0"/>
+              <a:t> </a:t>
+            </a:r>
+            <a:r>
+              <a:rPr lang="sv-SE" dirty="0" smtClean="0"/>
+              <a:t>report (5 </a:t>
+            </a:r>
+            <a:r>
+              <a:rPr lang="sv-SE" dirty="0" err="1" smtClean="0"/>
+              <a:t>weeks</a:t>
+            </a:r>
+            <a:r>
+              <a:rPr lang="sv-SE" dirty="0" smtClean="0"/>
+              <a:t>)</a:t>
+            </a:r>
+            <a:endParaRPr lang="sv-SE" dirty="0" smtClean="0"/>
           </a:p>
           <a:p>
             <a:endParaRPr lang="sv-SE" dirty="0"/>
@@ -6406,33 +6576,15 @@
                                   </p:childTnLst>
                                 </p:cTn>
                               </p:par>
-                            </p:childTnLst>
-                          </p:cTn>
-                        </p:par>
-                      </p:childTnLst>
-                    </p:cTn>
-                  </p:par>
-                  <p:par>
-                    <p:cTn id="18" fill="hold">
-                      <p:stCondLst>
-                        <p:cond delay="indefinite"/>
-                      </p:stCondLst>
-                      <p:childTnLst>
-                        <p:par>
-                          <p:cTn id="19" fill="hold">
-                            <p:stCondLst>
-                              <p:cond delay="0"/>
-                            </p:stCondLst>
-                            <p:childTnLst>
                               <p:par>
-                                <p:cTn id="20" presetID="22" presetClass="entr" presetSubtype="4" fill="hold" grpId="0" nodeType="clickEffect">
+                                <p:cTn id="18" presetID="22" presetClass="entr" presetSubtype="4" fill="hold" grpId="0" nodeType="withEffect">
                                   <p:stCondLst>
                                     <p:cond delay="0"/>
                                   </p:stCondLst>
                                   <p:childTnLst>
                                     <p:set>
                                       <p:cBhvr>
-                                        <p:cTn id="21" dur="1" fill="hold">
+                                        <p:cTn id="19" dur="1" fill="hold">
                                           <p:stCondLst>
                                             <p:cond delay="0"/>
                                           </p:stCondLst>
@@ -6454,11 +6606,140 @@
                                     </p:set>
                                     <p:animEffect transition="in" filter="wipe(down)">
                                       <p:cBhvr>
-                                        <p:cTn id="22" dur="500"/>
+                                        <p:cTn id="20" dur="500"/>
                                         <p:tgtEl>
                                           <p:spTgt spid="3">
                                             <p:txEl>
                                               <p:pRg st="3" end="3"/>
+                                            </p:txEl>
+                                          </p:spTgt>
+                                        </p:tgtEl>
+                                      </p:cBhvr>
+                                    </p:animEffect>
+                                  </p:childTnLst>
+                                </p:cTn>
+                              </p:par>
+                              <p:par>
+                                <p:cTn id="21" presetID="22" presetClass="entr" presetSubtype="4" fill="hold" grpId="0" nodeType="withEffect">
+                                  <p:stCondLst>
+                                    <p:cond delay="0"/>
+                                  </p:stCondLst>
+                                  <p:childTnLst>
+                                    <p:set>
+                                      <p:cBhvr>
+                                        <p:cTn id="22" dur="1" fill="hold">
+                                          <p:stCondLst>
+                                            <p:cond delay="0"/>
+                                          </p:stCondLst>
+                                        </p:cTn>
+                                        <p:tgtEl>
+                                          <p:spTgt spid="3">
+                                            <p:txEl>
+                                              <p:pRg st="4" end="4"/>
+                                            </p:txEl>
+                                          </p:spTgt>
+                                        </p:tgtEl>
+                                        <p:attrNameLst>
+                                          <p:attrName>style.visibility</p:attrName>
+                                        </p:attrNameLst>
+                                      </p:cBhvr>
+                                      <p:to>
+                                        <p:strVal val="visible"/>
+                                      </p:to>
+                                    </p:set>
+                                    <p:animEffect transition="in" filter="wipe(down)">
+                                      <p:cBhvr>
+                                        <p:cTn id="23" dur="500"/>
+                                        <p:tgtEl>
+                                          <p:spTgt spid="3">
+                                            <p:txEl>
+                                              <p:pRg st="4" end="4"/>
+                                            </p:txEl>
+                                          </p:spTgt>
+                                        </p:tgtEl>
+                                      </p:cBhvr>
+                                    </p:animEffect>
+                                  </p:childTnLst>
+                                </p:cTn>
+                              </p:par>
+                              <p:par>
+                                <p:cTn id="24" presetID="22" presetClass="entr" presetSubtype="4" fill="hold" grpId="0" nodeType="withEffect">
+                                  <p:stCondLst>
+                                    <p:cond delay="0"/>
+                                  </p:stCondLst>
+                                  <p:childTnLst>
+                                    <p:set>
+                                      <p:cBhvr>
+                                        <p:cTn id="25" dur="1" fill="hold">
+                                          <p:stCondLst>
+                                            <p:cond delay="0"/>
+                                          </p:stCondLst>
+                                        </p:cTn>
+                                        <p:tgtEl>
+                                          <p:spTgt spid="3">
+                                            <p:txEl>
+                                              <p:pRg st="5" end="5"/>
+                                            </p:txEl>
+                                          </p:spTgt>
+                                        </p:tgtEl>
+                                        <p:attrNameLst>
+                                          <p:attrName>style.visibility</p:attrName>
+                                        </p:attrNameLst>
+                                      </p:cBhvr>
+                                      <p:to>
+                                        <p:strVal val="visible"/>
+                                      </p:to>
+                                    </p:set>
+                                    <p:animEffect transition="in" filter="wipe(down)">
+                                      <p:cBhvr>
+                                        <p:cTn id="26" dur="500"/>
+                                        <p:tgtEl>
+                                          <p:spTgt spid="3">
+                                            <p:txEl>
+                                              <p:pRg st="5" end="5"/>
+                                            </p:txEl>
+                                          </p:spTgt>
+                                        </p:tgtEl>
+                                      </p:cBhvr>
+                                    </p:animEffect>
+                                  </p:childTnLst>
+                                </p:cTn>
+                              </p:par>
+                              <p:par>
+                                <p:cTn id="27" presetID="22" presetClass="entr" presetSubtype="4" fill="hold" grpId="0" nodeType="withEffect">
+                                  <p:stCondLst>
+                                    <p:cond delay="0"/>
+                                  </p:stCondLst>
+                                  <p:childTnLst>
+                                    <p:set>
+                                      <p:cBhvr>
+                                        <p:cTn id="28" dur="1" fill="hold">
+                                          <p:stCondLst>
+                                            <p:cond delay="0"/>
+                                          </p:stCondLst>
+                                        </p:cTn>
+                                        <p:tgtEl>
+                                          <p:spTgt spid="3">
+                                            <p:txEl>
+                                              <p:pRg st="6" end="6"/>
+                                            </p:txEl>
+                                          </p:spTgt>
+                                        </p:tgtEl>
+                                        <p:attrNameLst>
+                                          <p:attrName>style.visibility</p:attrName>
+                                        </p:attrNameLst>
+                                      </p:cBhvr>
+                                      <p:to>
+                                        <p:strVal val="visible"/>
+                                      </p:to>
+                                    </p:set>
+                                    <p:animEffect transition="in" filter="wipe(down)">
+                                      <p:cBhvr>
+                                        <p:cTn id="29" dur="500"/>
+                                        <p:tgtEl>
+                                          <p:spTgt spid="3">
+                                            <p:txEl>
+                                              <p:pRg st="6" end="6"/>
                                             </p:txEl>
                                           </p:spTgt>
                                         </p:tgtEl>
@@ -6595,6 +6876,29 @@
           </a:p>
           <a:p>
             <a:r>
+              <a:rPr lang="sv-SE" dirty="0" smtClean="0"/>
+              <a:t>Design</a:t>
+            </a:r>
+          </a:p>
+          <a:p>
+            <a:pPr lvl="1"/>
+            <a:r>
+              <a:rPr lang="sv-SE" dirty="0" err="1" smtClean="0"/>
+              <a:t>Agile</a:t>
+            </a:r>
+            <a:r>
+              <a:rPr lang="sv-SE" dirty="0" smtClean="0"/>
+              <a:t> </a:t>
+            </a:r>
+            <a:r>
+              <a:rPr lang="sv-SE" dirty="0" err="1" smtClean="0"/>
+              <a:t>manifesto</a:t>
+            </a:r>
+            <a:endParaRPr lang="sv-SE" dirty="0" smtClean="0"/>
+          </a:p>
+          <a:p>
+            <a:pPr lvl="1"/>
+            <a:r>
               <a:rPr lang="sv-SE" dirty="0" err="1" smtClean="0"/>
               <a:t>User</a:t>
             </a:r>
@@ -6604,18 +6908,15 @@
             </a:r>
             <a:r>
               <a:rPr lang="sv-SE" dirty="0" err="1" smtClean="0"/>
-              <a:t>analyis</a:t>
+              <a:t>focus</a:t>
             </a:r>
             <a:endParaRPr lang="sv-SE" dirty="0" smtClean="0"/>
           </a:p>
           <a:p>
-            <a:r>
-              <a:rPr lang="sv-SE" dirty="0" smtClean="0"/>
-              <a:t>System has </a:t>
-            </a:r>
+            <a:pPr lvl="1"/>
             <a:r>
               <a:rPr lang="sv-SE" dirty="0" err="1" smtClean="0"/>
-              <a:t>two</a:t>
+              <a:t>Two</a:t>
             </a:r>
             <a:r>
               <a:rPr lang="sv-SE" dirty="0" smtClean="0"/>
@@ -6628,37 +6929,6 @@
             <a:r>
               <a:rPr lang="sv-SE" dirty="0" smtClean="0"/>
               <a:t> parts</a:t>
-            </a:r>
-          </a:p>
-          <a:p>
-            <a:pPr lvl="1"/>
-            <a:r>
-              <a:rPr lang="sv-SE" dirty="0" err="1" smtClean="0"/>
-              <a:t>Calibration</a:t>
-            </a:r>
-            <a:endParaRPr lang="sv-SE" dirty="0" smtClean="0"/>
-          </a:p>
-          <a:p>
-            <a:pPr lvl="1"/>
-            <a:r>
-              <a:rPr lang="sv-SE" dirty="0" smtClean="0"/>
-              <a:t>Experiments</a:t>
-            </a:r>
-          </a:p>
-          <a:p>
-            <a:r>
-              <a:rPr lang="sv-SE" dirty="0" err="1" smtClean="0"/>
-              <a:t>Model</a:t>
-            </a:r>
-            <a:r>
-              <a:rPr lang="sv-SE" dirty="0" smtClean="0"/>
-              <a:t> </a:t>
-            </a:r>
-            <a:r>
-              <a:rPr lang="sv-SE" dirty="0" smtClean="0">
-                <a:sym typeface="Wingdings" pitchFamily="2" charset="2"/>
-              </a:rPr>
-              <a:t> design</a:t>
             </a:r>
             <a:endParaRPr lang="sv-SE" dirty="0" smtClean="0"/>
           </a:p>
@@ -6923,33 +7193,15 @@
                                   </p:childTnLst>
                                 </p:cTn>
                               </p:par>
-                            </p:childTnLst>
-                          </p:cTn>
-                        </p:par>
-                      </p:childTnLst>
-                    </p:cTn>
-                  </p:par>
-                  <p:par>
-                    <p:cTn id="22" fill="hold">
-                      <p:stCondLst>
-                        <p:cond delay="indefinite"/>
-                      </p:stCondLst>
-                      <p:childTnLst>
-                        <p:par>
-                          <p:cTn id="23" fill="hold">
-                            <p:stCondLst>
-                              <p:cond delay="0"/>
-                            </p:stCondLst>
-                            <p:childTnLst>
                               <p:par>
-                                <p:cTn id="24" presetID="22" presetClass="entr" presetSubtype="4" fill="hold" grpId="0" nodeType="clickEffect">
+                                <p:cTn id="22" presetID="22" presetClass="entr" presetSubtype="4" fill="hold" grpId="0" nodeType="withEffect">
                                   <p:stCondLst>
                                     <p:cond delay="0"/>
                                   </p:stCondLst>
                                   <p:childTnLst>
                                     <p:set>
                                       <p:cBhvr>
-                                        <p:cTn id="25" dur="1" fill="hold">
+                                        <p:cTn id="23" dur="1" fill="hold">
                                           <p:stCondLst>
                                             <p:cond delay="0"/>
                                           </p:stCondLst>
@@ -6971,7 +7223,7 @@
                                     </p:set>
                                     <p:animEffect transition="in" filter="wipe(down)">
                                       <p:cBhvr>
-                                        <p:cTn id="26" dur="500"/>
+                                        <p:cTn id="24" dur="500"/>
                                         <p:tgtEl>
                                           <p:spTgt spid="3">
                                             <p:txEl>
@@ -6985,14 +7237,14 @@
                                 </p:cTn>
                               </p:par>
                               <p:par>
-                                <p:cTn id="27" presetID="22" presetClass="entr" presetSubtype="4" fill="hold" grpId="0" nodeType="withEffect">
+                                <p:cTn id="25" presetID="22" presetClass="entr" presetSubtype="4" fill="hold" grpId="0" nodeType="withEffect">
                                   <p:stCondLst>
                                     <p:cond delay="0"/>
                                   </p:stCondLst>
                                   <p:childTnLst>
                                     <p:set>
                                       <p:cBhvr>
-                                        <p:cTn id="28" dur="1" fill="hold">
+                                        <p:cTn id="26" dur="1" fill="hold">
                                           <p:stCondLst>
                                             <p:cond delay="0"/>
                                           </p:stCondLst>
@@ -7014,7 +7266,7 @@
                                     </p:set>
                                     <p:animEffect transition="in" filter="wipe(down)">
                                       <p:cBhvr>
-                                        <p:cTn id="29" dur="500"/>
+                                        <p:cTn id="27" dur="500"/>
                                         <p:tgtEl>
                                           <p:spTgt spid="3">
                                             <p:txEl>
@@ -7028,14 +7280,14 @@
                                 </p:cTn>
                               </p:par>
                               <p:par>
-                                <p:cTn id="30" presetID="22" presetClass="entr" presetSubtype="4" fill="hold" grpId="0" nodeType="withEffect">
+                                <p:cTn id="28" presetID="22" presetClass="entr" presetSubtype="4" fill="hold" grpId="0" nodeType="withEffect">
                                   <p:stCondLst>
                                     <p:cond delay="0"/>
                                   </p:stCondLst>
                                   <p:childTnLst>
                                     <p:set>
                                       <p:cBhvr>
-                                        <p:cTn id="31" dur="1" fill="hold">
+                                        <p:cTn id="29" dur="1" fill="hold">
                                           <p:stCondLst>
                                             <p:cond delay="0"/>
                                           </p:stCondLst>
@@ -7057,72 +7309,11 @@
                                     </p:set>
                                     <p:animEffect transition="in" filter="wipe(down)">
                                       <p:cBhvr>
-                                        <p:cTn id="32" dur="500"/>
+                                        <p:cTn id="30" dur="500"/>
                                         <p:tgtEl>
                                           <p:spTgt spid="3">
                                             <p:txEl>
                                               <p:pRg st="7" end="7"/>
-                                            </p:txEl>
-                                          </p:spTgt>
-                                        </p:tgtEl>
-                                      </p:cBhvr>
-                                    </p:animEffect>
-                                  </p:childTnLst>
-                                </p:cTn>
-                              </p:par>
-                            </p:childTnLst>
-                          </p:cTn>
-                        </p:par>
-                      </p:childTnLst>
-                    </p:cTn>
-                  </p:par>
-                  <p:par>
-                    <p:cTn id="33" fill="hold">
-                      <p:stCondLst>
-                        <p:cond delay="indefinite"/>
-                      </p:stCondLst>
-                      <p:childTnLst>
-                        <p:par>
-                          <p:cTn id="34" fill="hold">
-                            <p:stCondLst>
-                              <p:cond delay="0"/>
-                            </p:stCondLst>
-                            <p:childTnLst>
-                              <p:par>
-                                <p:cTn id="35" presetID="22" presetClass="entr" presetSubtype="4" fill="hold" grpId="0" nodeType="clickEffect">
-                                  <p:stCondLst>
-                                    <p:cond delay="0"/>
-                                  </p:stCondLst>
-                                  <p:childTnLst>
-                                    <p:set>
-                                      <p:cBhvr>
-                                        <p:cTn id="36" dur="1" fill="hold">
-                                          <p:stCondLst>
-                                            <p:cond delay="0"/>
-                                          </p:stCondLst>
-                                        </p:cTn>
-                                        <p:tgtEl>
-                                          <p:spTgt spid="3">
-                                            <p:txEl>
-                                              <p:pRg st="8" end="8"/>
-                                            </p:txEl>
-                                          </p:spTgt>
-                                        </p:tgtEl>
-                                        <p:attrNameLst>
-                                          <p:attrName>style.visibility</p:attrName>
-                                        </p:attrNameLst>
-                                      </p:cBhvr>
-                                      <p:to>
-                                        <p:strVal val="visible"/>
-                                      </p:to>
-                                    </p:set>
-                                    <p:animEffect transition="in" filter="wipe(down)">
-                                      <p:cBhvr>
-                                        <p:cTn id="37" dur="500"/>
-                                        <p:tgtEl>
-                                          <p:spTgt spid="3">
-                                            <p:txEl>
-                                              <p:pRg st="8" end="8"/>
                                             </p:txEl>
                                           </p:spTgt>
                                         </p:tgtEl>
@@ -7184,7 +7375,7 @@
       </p:grpSpPr>
       <p:sp>
         <p:nvSpPr>
-          <p:cNvPr id="2" name="Title 1"/>
+          <p:cNvPr id="7" name="Rubrik 6"/>
           <p:cNvSpPr>
             <a:spLocks noGrp="1"/>
           </p:cNvSpPr>
@@ -7194,14 +7385,45 @@
         </p:nvSpPr>
         <p:spPr/>
         <p:txBody>
-          <a:bodyPr>
-            <a:normAutofit/>
-          </a:bodyPr>
+          <a:bodyPr/>
           <a:lstStyle/>
           <a:p>
             <a:r>
+              <a:rPr lang="sv-SE" dirty="0" err="1" smtClean="0"/>
+              <a:t>Calibration</a:t>
+            </a:r>
+            <a:endParaRPr lang="sv-SE" dirty="0"/>
+          </a:p>
+        </p:txBody>
+      </p:sp>
+      <p:sp>
+        <p:nvSpPr>
+          <p:cNvPr id="8" name="Platshållare för innehåll 7"/>
+          <p:cNvSpPr>
+            <a:spLocks noGrp="1"/>
+          </p:cNvSpPr>
+          <p:nvPr>
+            <p:ph sz="half" idx="1"/>
+          </p:nvPr>
+        </p:nvSpPr>
+        <p:spPr/>
+        <p:txBody>
+          <a:bodyPr/>
+          <a:lstStyle/>
+          <a:p>
+            <a:r>
+              <a:rPr lang="sv-SE" dirty="0" err="1" smtClean="0"/>
+              <a:t>Tricky</a:t>
+            </a:r>
+            <a:r>
               <a:rPr lang="sv-SE" dirty="0" smtClean="0"/>
-              <a:t>Paper prototype</a:t>
+              <a:t>!</a:t>
+            </a:r>
+          </a:p>
+          <a:p>
+            <a:r>
+              <a:rPr lang="sv-SE" dirty="0" smtClean="0"/>
+              <a:t>Iterative design</a:t>
             </a:r>
             <a:endParaRPr lang="sv-SE" dirty="0"/>
           </a:p>
@@ -7209,12 +7431,12 @@
       </p:sp>
       <p:pic>
         <p:nvPicPr>
-          <p:cNvPr id="4" name="Content Placeholder 3" descr="onstartup.png"/>
+          <p:cNvPr id="10" name="Content Placeholder 3" descr="onstartup.png"/>
           <p:cNvPicPr>
             <a:picLocks noGrp="1" noChangeAspect="1"/>
           </p:cNvPicPr>
           <p:nvPr>
-            <p:ph idx="1"/>
+            <p:ph sz="half" idx="2"/>
           </p:nvPr>
         </p:nvPicPr>
         <p:blipFill>
@@ -7225,8 +7447,8 @@
         </p:blipFill>
         <p:spPr>
           <a:xfrm>
-            <a:off x="3491219" y="1447800"/>
-            <a:ext cx="3387111" cy="4800600"/>
+            <a:off x="5460099" y="1524000"/>
+            <a:ext cx="3291101" cy="4664075"/>
           </a:xfrm>
         </p:spPr>
       </p:pic>
@@ -7265,7 +7487,7 @@
       </p:grpSpPr>
       <p:sp>
         <p:nvSpPr>
-          <p:cNvPr id="2" name="Title 1"/>
+          <p:cNvPr id="2" name="Rubrik 1"/>
           <p:cNvSpPr>
             <a:spLocks noGrp="1"/>
           </p:cNvSpPr>
@@ -7280,7 +7502,64 @@
           <a:p>
             <a:r>
               <a:rPr lang="sv-SE" dirty="0" smtClean="0"/>
-              <a:t>Paper prototype</a:t>
+              <a:t>The </a:t>
+            </a:r>
+            <a:r>
+              <a:rPr lang="sv-SE" dirty="0" err="1" smtClean="0"/>
+              <a:t>main</a:t>
+            </a:r>
+            <a:r>
+              <a:rPr lang="sv-SE" dirty="0" smtClean="0"/>
+              <a:t> </a:t>
+            </a:r>
+            <a:r>
+              <a:rPr lang="sv-SE" dirty="0" err="1" smtClean="0"/>
+              <a:t>view</a:t>
+            </a:r>
+            <a:endParaRPr lang="sv-SE" dirty="0"/>
+          </a:p>
+        </p:txBody>
+      </p:sp>
+      <p:sp>
+        <p:nvSpPr>
+          <p:cNvPr id="3" name="Platshållare för innehåll 2"/>
+          <p:cNvSpPr>
+            <a:spLocks noGrp="1"/>
+          </p:cNvSpPr>
+          <p:nvPr>
+            <p:ph sz="half" idx="1"/>
+          </p:nvPr>
+        </p:nvSpPr>
+        <p:spPr/>
+        <p:txBody>
+          <a:bodyPr/>
+          <a:lstStyle/>
+          <a:p>
+            <a:r>
+              <a:rPr lang="sv-SE" dirty="0" smtClean="0"/>
+              <a:t>Straight forward</a:t>
+            </a:r>
+          </a:p>
+          <a:p>
+            <a:r>
+              <a:rPr lang="sv-SE" dirty="0" err="1" smtClean="0"/>
+              <a:t>Following</a:t>
+            </a:r>
+            <a:r>
+              <a:rPr lang="sv-SE" dirty="0" smtClean="0"/>
+              <a:t> </a:t>
+            </a:r>
+            <a:r>
+              <a:rPr lang="sv-SE" dirty="0" err="1" smtClean="0"/>
+              <a:t>usability</a:t>
+            </a:r>
+            <a:r>
+              <a:rPr lang="sv-SE" dirty="0" smtClean="0"/>
+              <a:t> </a:t>
+            </a:r>
+            <a:r>
+              <a:rPr lang="sv-SE" dirty="0" err="1" smtClean="0"/>
+              <a:t>heuristics</a:t>
             </a:r>
             <a:endParaRPr lang="sv-SE" dirty="0"/>
           </a:p>
@@ -7288,12 +7567,12 @@
       </p:sp>
       <p:pic>
         <p:nvPicPr>
-          <p:cNvPr id="7" name="Content Placeholder 6" descr="mainwindow.png"/>
+          <p:cNvPr id="5" name="Content Placeholder 6" descr="mainwindow.png"/>
           <p:cNvPicPr>
             <a:picLocks noGrp="1" noChangeAspect="1"/>
           </p:cNvPicPr>
           <p:nvPr>
-            <p:ph idx="1"/>
+            <p:ph sz="half" idx="2"/>
           </p:nvPr>
         </p:nvPicPr>
         <p:blipFill>
@@ -7304,8 +7583,8 @@
         </p:blipFill>
         <p:spPr>
           <a:xfrm>
-            <a:off x="2093271" y="1447800"/>
-            <a:ext cx="6183007" cy="4800600"/>
+            <a:off x="5276850" y="2436123"/>
+            <a:ext cx="3657600" cy="2839828"/>
           </a:xfrm>
         </p:spPr>
       </p:pic>

</xml_diff>